<commit_message>
Fix typo and saving homework PDFs
Co-Authored-By: Llewellyn Falco <10874+isidore@users.noreply.github.com>
</commit_message>
<xml_diff>
--- a/Homework Printouts.pptx
+++ b/Homework Printouts.pptx
@@ -246,7 +246,7 @@
           <a:p>
             <a:fld id="{9BAD008B-C58F-DC47-9BDF-ACF9484DF185}" type="datetimeFigureOut">
               <a:rPr lang="en-GB" smtClean="0"/>
-              <a:t>12/11/2020</a:t>
+              <a:t>16/11/2020</a:t>
             </a:fld>
             <a:endParaRPr lang="en-GB"/>
           </a:p>
@@ -416,7 +416,7 @@
           <a:p>
             <a:fld id="{9BAD008B-C58F-DC47-9BDF-ACF9484DF185}" type="datetimeFigureOut">
               <a:rPr lang="en-GB" smtClean="0"/>
-              <a:t>12/11/2020</a:t>
+              <a:t>16/11/2020</a:t>
             </a:fld>
             <a:endParaRPr lang="en-GB"/>
           </a:p>
@@ -596,7 +596,7 @@
           <a:p>
             <a:fld id="{9BAD008B-C58F-DC47-9BDF-ACF9484DF185}" type="datetimeFigureOut">
               <a:rPr lang="en-GB" smtClean="0"/>
-              <a:t>12/11/2020</a:t>
+              <a:t>16/11/2020</a:t>
             </a:fld>
             <a:endParaRPr lang="en-GB"/>
           </a:p>
@@ -698,7 +698,7 @@
                 </a:solidFill>
               </a:rPr>
               <a:pPr/>
-              <a:t>11/12/20</a:t>
+              <a:t>11/16/20</a:t>
             </a:fld>
             <a:endParaRPr lang="en-US">
               <a:solidFill>
@@ -1057,7 +1057,7 @@
           <a:p>
             <a:fld id="{9BAD008B-C58F-DC47-9BDF-ACF9484DF185}" type="datetimeFigureOut">
               <a:rPr lang="en-GB" smtClean="0"/>
-              <a:t>12/11/2020</a:t>
+              <a:t>16/11/2020</a:t>
             </a:fld>
             <a:endParaRPr lang="en-GB"/>
           </a:p>
@@ -1301,7 +1301,7 @@
           <a:p>
             <a:fld id="{9BAD008B-C58F-DC47-9BDF-ACF9484DF185}" type="datetimeFigureOut">
               <a:rPr lang="en-GB" smtClean="0"/>
-              <a:t>12/11/2020</a:t>
+              <a:t>16/11/2020</a:t>
             </a:fld>
             <a:endParaRPr lang="en-GB"/>
           </a:p>
@@ -1533,7 +1533,7 @@
           <a:p>
             <a:fld id="{9BAD008B-C58F-DC47-9BDF-ACF9484DF185}" type="datetimeFigureOut">
               <a:rPr lang="en-GB" smtClean="0"/>
-              <a:t>12/11/2020</a:t>
+              <a:t>16/11/2020</a:t>
             </a:fld>
             <a:endParaRPr lang="en-GB"/>
           </a:p>
@@ -1900,7 +1900,7 @@
           <a:p>
             <a:fld id="{9BAD008B-C58F-DC47-9BDF-ACF9484DF185}" type="datetimeFigureOut">
               <a:rPr lang="en-GB" smtClean="0"/>
-              <a:t>12/11/2020</a:t>
+              <a:t>16/11/2020</a:t>
             </a:fld>
             <a:endParaRPr lang="en-GB"/>
           </a:p>
@@ -2018,7 +2018,7 @@
           <a:p>
             <a:fld id="{9BAD008B-C58F-DC47-9BDF-ACF9484DF185}" type="datetimeFigureOut">
               <a:rPr lang="en-GB" smtClean="0"/>
-              <a:t>12/11/2020</a:t>
+              <a:t>16/11/2020</a:t>
             </a:fld>
             <a:endParaRPr lang="en-GB"/>
           </a:p>
@@ -2113,7 +2113,7 @@
           <a:p>
             <a:fld id="{9BAD008B-C58F-DC47-9BDF-ACF9484DF185}" type="datetimeFigureOut">
               <a:rPr lang="en-GB" smtClean="0"/>
-              <a:t>12/11/2020</a:t>
+              <a:t>16/11/2020</a:t>
             </a:fld>
             <a:endParaRPr lang="en-GB"/>
           </a:p>
@@ -2390,7 +2390,7 @@
           <a:p>
             <a:fld id="{9BAD008B-C58F-DC47-9BDF-ACF9484DF185}" type="datetimeFigureOut">
               <a:rPr lang="en-GB" smtClean="0"/>
-              <a:t>12/11/2020</a:t>
+              <a:t>16/11/2020</a:t>
             </a:fld>
             <a:endParaRPr lang="en-GB"/>
           </a:p>
@@ -2647,7 +2647,7 @@
           <a:p>
             <a:fld id="{9BAD008B-C58F-DC47-9BDF-ACF9484DF185}" type="datetimeFigureOut">
               <a:rPr lang="en-GB" smtClean="0"/>
-              <a:t>12/11/2020</a:t>
+              <a:t>16/11/2020</a:t>
             </a:fld>
             <a:endParaRPr lang="en-GB"/>
           </a:p>
@@ -2860,7 +2860,7 @@
           <a:p>
             <a:fld id="{9BAD008B-C58F-DC47-9BDF-ACF9484DF185}" type="datetimeFigureOut">
               <a:rPr lang="en-GB" smtClean="0"/>
-              <a:t>12/11/2020</a:t>
+              <a:t>16/11/2020</a:t>
             </a:fld>
             <a:endParaRPr lang="en-GB"/>
           </a:p>
@@ -8123,7 +8123,7 @@
           <a:p>
             <a:r>
               <a:rPr lang="en-GB" dirty="0"/>
-              <a:t>Redo The Bowl Kata</a:t>
+              <a:t>Redo The Bowling Kata</a:t>
             </a:r>
           </a:p>
           <a:p>
@@ -8815,7 +8815,7 @@
         </p:nvSpPr>
         <p:spPr>
           <a:xfrm>
-            <a:off x="2375632" y="1331303"/>
+            <a:off x="2683205" y="1331303"/>
             <a:ext cx="169830" cy="169830"/>
           </a:xfrm>
           <a:prstGeom prst="rect">
@@ -8867,7 +8867,7 @@
         </p:nvSpPr>
         <p:spPr>
           <a:xfrm>
-            <a:off x="2323349" y="1205982"/>
+            <a:off x="2630922" y="1205982"/>
             <a:ext cx="490451" cy="369332"/>
           </a:xfrm>
           <a:prstGeom prst="rect">

</xml_diff>